<commit_message>
revised slides for 2021
</commit_message>
<xml_diff>
--- a/Wi21_content/SEDS/L10.Communication.pptx
+++ b/Wi21_content/SEDS/L10.Communication.pptx
@@ -234,7 +234,7 @@
           <a:p>
             <a:fld id="{08F62E20-B1AA-3442-B8F1-F4A56998389D}" type="datetimeFigureOut">
               <a:rPr lang="en-US" smtClean="0"/>
-              <a:t>2/13/20</a:t>
+              <a:t>2/9/21</a:t>
             </a:fld>
             <a:endParaRPr lang="en-US"/>
           </a:p>
@@ -7107,7 +7107,7 @@
                 <a:cs typeface="Calibri"/>
                 <a:sym typeface="Calibri"/>
               </a:rPr>
-              <a:t>Next Thu. every project will present</a:t>
+              <a:t>Next week on Thu. every project will present</a:t>
             </a:r>
           </a:p>
           <a:p>
@@ -7156,7 +7156,31 @@
                 <a:cs typeface="Calibri"/>
                 <a:sym typeface="Calibri"/>
               </a:rPr>
-              <a:t> I will cut you off</a:t>
+              <a:t> </a:t>
+            </a:r>
+            <a:r>
+              <a:rPr lang="en-US" sz="2400" dirty="0" err="1">
+                <a:solidFill>
+                  <a:schemeClr val="dk1"/>
+                </a:solidFill>
+                <a:latin typeface="Calibri"/>
+                <a:ea typeface="Calibri"/>
+                <a:cs typeface="Calibri"/>
+                <a:sym typeface="Calibri"/>
+              </a:rPr>
+              <a:t>Sabiha</a:t>
+            </a:r>
+            <a:r>
+              <a:rPr lang="en-US" sz="2400" dirty="0">
+                <a:solidFill>
+                  <a:schemeClr val="dk1"/>
+                </a:solidFill>
+                <a:latin typeface="Calibri"/>
+                <a:ea typeface="Calibri"/>
+                <a:cs typeface="Calibri"/>
+                <a:sym typeface="Calibri"/>
+              </a:rPr>
+              <a:t> will cut you off</a:t>
             </a:r>
           </a:p>
           <a:p>

</xml_diff>